<commit_message>
Modifications made after making Unit 01 Videos
</commit_message>
<xml_diff>
--- a/01_Unit/PowerPoints/01_HelloWorldWhitespaceConventions.pptx
+++ b/01_Unit/PowerPoints/01_HelloWorldWhitespaceConventions.pptx
@@ -145,487 +145,6 @@
 </p:presentation>
 </file>
 
-<file path=ppt/revisionInfo.xml><?xml version="1.0" encoding="utf-8"?>
-<p1510:revInfo xmlns:a="http://schemas.openxmlformats.org/drawingml/2006/main" xmlns:r="http://schemas.openxmlformats.org/officeDocument/2006/relationships" xmlns:p1510="http://schemas.microsoft.com/office/powerpoint/2015/10/main">
-  <p1510:revLst>
-    <p1510:client id="{66F978F5-050C-4757-92B1-DCF09D03401F}" v="2" dt="2020-07-28T19:49:33.175"/>
-  </p1510:revLst>
-</p1510:revInfo>
-</file>
-
-<file path=ppt/changesInfos/changesInfo1.xml><?xml version="1.0" encoding="utf-8"?>
-<pc:chgInfo xmlns:a="http://schemas.openxmlformats.org/drawingml/2006/main" xmlns:r="http://schemas.openxmlformats.org/officeDocument/2006/relationships" xmlns:ac="http://schemas.microsoft.com/office/drawing/2013/main/command" xmlns:pc="http://schemas.microsoft.com/office/powerpoint/2013/main/command">
-  <pc:docChgLst>
-    <pc:chgData name="Wang, Charles" userId="b1269e5f-19cd-4bc8-97bb-dd1e093c722b" providerId="ADAL" clId="{66F978F5-050C-4757-92B1-DCF09D03401F}"/>
-    <pc:docChg chg="undo custSel addSld delSld modSld sldOrd">
-      <pc:chgData name="Wang, Charles" userId="b1269e5f-19cd-4bc8-97bb-dd1e093c722b" providerId="ADAL" clId="{66F978F5-050C-4757-92B1-DCF09D03401F}" dt="2020-07-29T17:50:42.939" v="2775" actId="14"/>
-      <pc:docMkLst>
-        <pc:docMk/>
-      </pc:docMkLst>
-      <pc:sldChg chg="del">
-        <pc:chgData name="Wang, Charles" userId="b1269e5f-19cd-4bc8-97bb-dd1e093c722b" providerId="ADAL" clId="{66F978F5-050C-4757-92B1-DCF09D03401F}" dt="2020-07-28T19:37:07.094" v="1763" actId="47"/>
-        <pc:sldMkLst>
-          <pc:docMk/>
-          <pc:sldMk cId="94479082" sldId="258"/>
-        </pc:sldMkLst>
-      </pc:sldChg>
-      <pc:sldChg chg="modSp mod">
-        <pc:chgData name="Wang, Charles" userId="b1269e5f-19cd-4bc8-97bb-dd1e093c722b" providerId="ADAL" clId="{66F978F5-050C-4757-92B1-DCF09D03401F}" dt="2020-07-28T18:58:55.561" v="1646" actId="20577"/>
-        <pc:sldMkLst>
-          <pc:docMk/>
-          <pc:sldMk cId="486591518" sldId="259"/>
-        </pc:sldMkLst>
-        <pc:spChg chg="mod">
-          <ac:chgData name="Wang, Charles" userId="b1269e5f-19cd-4bc8-97bb-dd1e093c722b" providerId="ADAL" clId="{66F978F5-050C-4757-92B1-DCF09D03401F}" dt="2020-07-28T18:58:55.561" v="1646" actId="20577"/>
-          <ac:spMkLst>
-            <pc:docMk/>
-            <pc:sldMk cId="486591518" sldId="259"/>
-            <ac:spMk id="3" creationId="{64A57FBD-E53C-45F7-80C7-D7D741C260A8}"/>
-          </ac:spMkLst>
-        </pc:spChg>
-      </pc:sldChg>
-      <pc:sldChg chg="modNotesTx">
-        <pc:chgData name="Wang, Charles" userId="b1269e5f-19cd-4bc8-97bb-dd1e093c722b" providerId="ADAL" clId="{66F978F5-050C-4757-92B1-DCF09D03401F}" dt="2020-07-27T14:55:35.250" v="1616" actId="20577"/>
-        <pc:sldMkLst>
-          <pc:docMk/>
-          <pc:sldMk cId="1915886142" sldId="261"/>
-        </pc:sldMkLst>
-      </pc:sldChg>
-      <pc:sldChg chg="del modNotesTx">
-        <pc:chgData name="Wang, Charles" userId="b1269e5f-19cd-4bc8-97bb-dd1e093c722b" providerId="ADAL" clId="{66F978F5-050C-4757-92B1-DCF09D03401F}" dt="2020-07-28T19:38:51.056" v="1781" actId="47"/>
-        <pc:sldMkLst>
-          <pc:docMk/>
-          <pc:sldMk cId="377986214" sldId="263"/>
-        </pc:sldMkLst>
-      </pc:sldChg>
-      <pc:sldChg chg="modSp mod">
-        <pc:chgData name="Wang, Charles" userId="b1269e5f-19cd-4bc8-97bb-dd1e093c722b" providerId="ADAL" clId="{66F978F5-050C-4757-92B1-DCF09D03401F}" dt="2020-07-28T19:12:32.357" v="1647" actId="20577"/>
-        <pc:sldMkLst>
-          <pc:docMk/>
-          <pc:sldMk cId="2893643321" sldId="265"/>
-        </pc:sldMkLst>
-        <pc:spChg chg="mod">
-          <ac:chgData name="Wang, Charles" userId="b1269e5f-19cd-4bc8-97bb-dd1e093c722b" providerId="ADAL" clId="{66F978F5-050C-4757-92B1-DCF09D03401F}" dt="2020-07-28T19:12:32.357" v="1647" actId="20577"/>
-          <ac:spMkLst>
-            <pc:docMk/>
-            <pc:sldMk cId="2893643321" sldId="265"/>
-            <ac:spMk id="3" creationId="{97BF11EC-95EA-4CEC-81CB-8961A028BB2E}"/>
-          </ac:spMkLst>
-        </pc:spChg>
-      </pc:sldChg>
-      <pc:sldChg chg="del modNotesTx">
-        <pc:chgData name="Wang, Charles" userId="b1269e5f-19cd-4bc8-97bb-dd1e093c722b" providerId="ADAL" clId="{66F978F5-050C-4757-92B1-DCF09D03401F}" dt="2020-07-28T19:38:51.056" v="1781" actId="47"/>
-        <pc:sldMkLst>
-          <pc:docMk/>
-          <pc:sldMk cId="1579511963" sldId="266"/>
-        </pc:sldMkLst>
-      </pc:sldChg>
-      <pc:sldChg chg="addSp modSp mod modClrScheme chgLayout">
-        <pc:chgData name="Wang, Charles" userId="b1269e5f-19cd-4bc8-97bb-dd1e093c722b" providerId="ADAL" clId="{66F978F5-050C-4757-92B1-DCF09D03401F}" dt="2020-07-28T19:36:50.008" v="1761" actId="20577"/>
-        <pc:sldMkLst>
-          <pc:docMk/>
-          <pc:sldMk cId="66014656" sldId="267"/>
-        </pc:sldMkLst>
-        <pc:spChg chg="add mod">
-          <ac:chgData name="Wang, Charles" userId="b1269e5f-19cd-4bc8-97bb-dd1e093c722b" providerId="ADAL" clId="{66F978F5-050C-4757-92B1-DCF09D03401F}" dt="2020-07-28T19:36:50.008" v="1761" actId="20577"/>
-          <ac:spMkLst>
-            <pc:docMk/>
-            <pc:sldMk cId="66014656" sldId="267"/>
-            <ac:spMk id="2" creationId="{02888184-B351-42BB-A306-13EAE3B15ABE}"/>
-          </ac:spMkLst>
-        </pc:spChg>
-        <pc:spChg chg="add mod">
-          <ac:chgData name="Wang, Charles" userId="b1269e5f-19cd-4bc8-97bb-dd1e093c722b" providerId="ADAL" clId="{66F978F5-050C-4757-92B1-DCF09D03401F}" dt="2020-07-28T19:36:45.422" v="1740" actId="700"/>
-          <ac:spMkLst>
-            <pc:docMk/>
-            <pc:sldMk cId="66014656" sldId="267"/>
-            <ac:spMk id="3" creationId="{3C4737D6-58B6-4B18-AAB7-93E22AB9B406}"/>
-          </ac:spMkLst>
-        </pc:spChg>
-      </pc:sldChg>
-      <pc:sldChg chg="addSp modSp mod modClrScheme chgLayout">
-        <pc:chgData name="Wang, Charles" userId="b1269e5f-19cd-4bc8-97bb-dd1e093c722b" providerId="ADAL" clId="{66F978F5-050C-4757-92B1-DCF09D03401F}" dt="2020-07-28T19:37:31.469" v="1769" actId="20577"/>
-        <pc:sldMkLst>
-          <pc:docMk/>
-          <pc:sldMk cId="2829273256" sldId="268"/>
-        </pc:sldMkLst>
-        <pc:spChg chg="add mod">
-          <ac:chgData name="Wang, Charles" userId="b1269e5f-19cd-4bc8-97bb-dd1e093c722b" providerId="ADAL" clId="{66F978F5-050C-4757-92B1-DCF09D03401F}" dt="2020-07-28T19:37:31.469" v="1769" actId="20577"/>
-          <ac:spMkLst>
-            <pc:docMk/>
-            <pc:sldMk cId="2829273256" sldId="268"/>
-            <ac:spMk id="2" creationId="{4BDE06F8-E4FC-4D62-88FC-FAAA8B74B4FC}"/>
-          </ac:spMkLst>
-        </pc:spChg>
-        <pc:spChg chg="add mod">
-          <ac:chgData name="Wang, Charles" userId="b1269e5f-19cd-4bc8-97bb-dd1e093c722b" providerId="ADAL" clId="{66F978F5-050C-4757-92B1-DCF09D03401F}" dt="2020-07-28T19:37:23.423" v="1767" actId="700"/>
-          <ac:spMkLst>
-            <pc:docMk/>
-            <pc:sldMk cId="2829273256" sldId="268"/>
-            <ac:spMk id="3" creationId="{694F7772-2FDC-4ACB-8163-DE44E6E34F66}"/>
-          </ac:spMkLst>
-        </pc:spChg>
-      </pc:sldChg>
-      <pc:sldChg chg="addSp modSp mod modClrScheme chgLayout">
-        <pc:chgData name="Wang, Charles" userId="b1269e5f-19cd-4bc8-97bb-dd1e093c722b" providerId="ADAL" clId="{66F978F5-050C-4757-92B1-DCF09D03401F}" dt="2020-07-28T19:37:50.348" v="1772" actId="20577"/>
-        <pc:sldMkLst>
-          <pc:docMk/>
-          <pc:sldMk cId="4221294463" sldId="269"/>
-        </pc:sldMkLst>
-        <pc:spChg chg="add mod">
-          <ac:chgData name="Wang, Charles" userId="b1269e5f-19cd-4bc8-97bb-dd1e093c722b" providerId="ADAL" clId="{66F978F5-050C-4757-92B1-DCF09D03401F}" dt="2020-07-28T19:37:50.348" v="1772" actId="20577"/>
-          <ac:spMkLst>
-            <pc:docMk/>
-            <pc:sldMk cId="4221294463" sldId="269"/>
-            <ac:spMk id="2" creationId="{5389E493-FE54-4082-8E4D-A403D75A4746}"/>
-          </ac:spMkLst>
-        </pc:spChg>
-        <pc:spChg chg="add mod">
-          <ac:chgData name="Wang, Charles" userId="b1269e5f-19cd-4bc8-97bb-dd1e093c722b" providerId="ADAL" clId="{66F978F5-050C-4757-92B1-DCF09D03401F}" dt="2020-07-28T19:37:36.031" v="1770" actId="700"/>
-          <ac:spMkLst>
-            <pc:docMk/>
-            <pc:sldMk cId="4221294463" sldId="269"/>
-            <ac:spMk id="3" creationId="{2FE10736-E845-4428-AD9C-59827F6647CD}"/>
-          </ac:spMkLst>
-        </pc:spChg>
-      </pc:sldChg>
-      <pc:sldChg chg="addSp modSp mod modClrScheme chgLayout">
-        <pc:chgData name="Wang, Charles" userId="b1269e5f-19cd-4bc8-97bb-dd1e093c722b" providerId="ADAL" clId="{66F978F5-050C-4757-92B1-DCF09D03401F}" dt="2020-07-28T19:38:04.538" v="1775" actId="20577"/>
-        <pc:sldMkLst>
-          <pc:docMk/>
-          <pc:sldMk cId="2131289348" sldId="270"/>
-        </pc:sldMkLst>
-        <pc:spChg chg="add mod">
-          <ac:chgData name="Wang, Charles" userId="b1269e5f-19cd-4bc8-97bb-dd1e093c722b" providerId="ADAL" clId="{66F978F5-050C-4757-92B1-DCF09D03401F}" dt="2020-07-28T19:38:04.538" v="1775" actId="20577"/>
-          <ac:spMkLst>
-            <pc:docMk/>
-            <pc:sldMk cId="2131289348" sldId="270"/>
-            <ac:spMk id="2" creationId="{CD748C5B-18B5-4C63-884D-8E80B3139C32}"/>
-          </ac:spMkLst>
-        </pc:spChg>
-        <pc:spChg chg="add mod">
-          <ac:chgData name="Wang, Charles" userId="b1269e5f-19cd-4bc8-97bb-dd1e093c722b" providerId="ADAL" clId="{66F978F5-050C-4757-92B1-DCF09D03401F}" dt="2020-07-28T19:38:02.285" v="1773" actId="700"/>
-          <ac:spMkLst>
-            <pc:docMk/>
-            <pc:sldMk cId="2131289348" sldId="270"/>
-            <ac:spMk id="3" creationId="{0E4259A7-D34F-41DD-BF7A-72622EE1BF2D}"/>
-          </ac:spMkLst>
-        </pc:spChg>
-      </pc:sldChg>
-      <pc:sldChg chg="del">
-        <pc:chgData name="Wang, Charles" userId="b1269e5f-19cd-4bc8-97bb-dd1e093c722b" providerId="ADAL" clId="{66F978F5-050C-4757-92B1-DCF09D03401F}" dt="2020-07-28T19:38:51.056" v="1781" actId="47"/>
-        <pc:sldMkLst>
-          <pc:docMk/>
-          <pc:sldMk cId="2255381428" sldId="271"/>
-        </pc:sldMkLst>
-      </pc:sldChg>
-      <pc:sldChg chg="modSp mod">
-        <pc:chgData name="Wang, Charles" userId="b1269e5f-19cd-4bc8-97bb-dd1e093c722b" providerId="ADAL" clId="{66F978F5-050C-4757-92B1-DCF09D03401F}" dt="2020-07-28T20:06:19.279" v="2268" actId="20577"/>
-        <pc:sldMkLst>
-          <pc:docMk/>
-          <pc:sldMk cId="1727566522" sldId="276"/>
-        </pc:sldMkLst>
-        <pc:spChg chg="mod">
-          <ac:chgData name="Wang, Charles" userId="b1269e5f-19cd-4bc8-97bb-dd1e093c722b" providerId="ADAL" clId="{66F978F5-050C-4757-92B1-DCF09D03401F}" dt="2020-07-28T20:06:19.279" v="2268" actId="20577"/>
-          <ac:spMkLst>
-            <pc:docMk/>
-            <pc:sldMk cId="1727566522" sldId="276"/>
-            <ac:spMk id="3" creationId="{E6A666D6-AB47-4AC5-AF89-E91B76A86F1C}"/>
-          </ac:spMkLst>
-        </pc:spChg>
-        <pc:spChg chg="mod">
-          <ac:chgData name="Wang, Charles" userId="b1269e5f-19cd-4bc8-97bb-dd1e093c722b" providerId="ADAL" clId="{66F978F5-050C-4757-92B1-DCF09D03401F}" dt="2020-07-28T20:05:52.198" v="2243" actId="20577"/>
-          <ac:spMkLst>
-            <pc:docMk/>
-            <pc:sldMk cId="1727566522" sldId="276"/>
-            <ac:spMk id="4" creationId="{8820B31A-811F-4660-A51D-BE6DCF7CD53F}"/>
-          </ac:spMkLst>
-        </pc:spChg>
-      </pc:sldChg>
-      <pc:sldChg chg="modSp add mod ord">
-        <pc:chgData name="Wang, Charles" userId="b1269e5f-19cd-4bc8-97bb-dd1e093c722b" providerId="ADAL" clId="{66F978F5-050C-4757-92B1-DCF09D03401F}" dt="2020-07-29T15:10:02.520" v="2692" actId="20577"/>
-        <pc:sldMkLst>
-          <pc:docMk/>
-          <pc:sldMk cId="2986473969" sldId="279"/>
-        </pc:sldMkLst>
-        <pc:spChg chg="mod">
-          <ac:chgData name="Wang, Charles" userId="b1269e5f-19cd-4bc8-97bb-dd1e093c722b" providerId="ADAL" clId="{66F978F5-050C-4757-92B1-DCF09D03401F}" dt="2020-07-29T15:10:02.520" v="2692" actId="20577"/>
-          <ac:spMkLst>
-            <pc:docMk/>
-            <pc:sldMk cId="2986473969" sldId="279"/>
-            <ac:spMk id="3" creationId="{E6A666D6-AB47-4AC5-AF89-E91B76A86F1C}"/>
-          </ac:spMkLst>
-        </pc:spChg>
-      </pc:sldChg>
-      <pc:sldChg chg="modSp add mod">
-        <pc:chgData name="Wang, Charles" userId="b1269e5f-19cd-4bc8-97bb-dd1e093c722b" providerId="ADAL" clId="{66F978F5-050C-4757-92B1-DCF09D03401F}" dt="2020-07-28T19:33:35.984" v="1726" actId="20577"/>
-        <pc:sldMkLst>
-          <pc:docMk/>
-          <pc:sldMk cId="1804022799" sldId="280"/>
-        </pc:sldMkLst>
-        <pc:spChg chg="mod">
-          <ac:chgData name="Wang, Charles" userId="b1269e5f-19cd-4bc8-97bb-dd1e093c722b" providerId="ADAL" clId="{66F978F5-050C-4757-92B1-DCF09D03401F}" dt="2020-07-28T19:12:51.341" v="1659" actId="20577"/>
-          <ac:spMkLst>
-            <pc:docMk/>
-            <pc:sldMk cId="1804022799" sldId="280"/>
-            <ac:spMk id="2" creationId="{75355994-6C54-41DA-9FEF-22C4894D5C02}"/>
-          </ac:spMkLst>
-        </pc:spChg>
-        <pc:spChg chg="mod">
-          <ac:chgData name="Wang, Charles" userId="b1269e5f-19cd-4bc8-97bb-dd1e093c722b" providerId="ADAL" clId="{66F978F5-050C-4757-92B1-DCF09D03401F}" dt="2020-07-28T19:33:35.984" v="1726" actId="20577"/>
-          <ac:spMkLst>
-            <pc:docMk/>
-            <pc:sldMk cId="1804022799" sldId="280"/>
-            <ac:spMk id="3" creationId="{E6A666D6-AB47-4AC5-AF89-E91B76A86F1C}"/>
-          </ac:spMkLst>
-        </pc:spChg>
-      </pc:sldChg>
-      <pc:sldChg chg="modSp add mod ord">
-        <pc:chgData name="Wang, Charles" userId="b1269e5f-19cd-4bc8-97bb-dd1e093c722b" providerId="ADAL" clId="{66F978F5-050C-4757-92B1-DCF09D03401F}" dt="2020-07-28T20:04:12.093" v="2001"/>
-        <pc:sldMkLst>
-          <pc:docMk/>
-          <pc:sldMk cId="655007746" sldId="281"/>
-        </pc:sldMkLst>
-        <pc:spChg chg="mod">
-          <ac:chgData name="Wang, Charles" userId="b1269e5f-19cd-4bc8-97bb-dd1e093c722b" providerId="ADAL" clId="{66F978F5-050C-4757-92B1-DCF09D03401F}" dt="2020-07-28T19:12:58.771" v="1670" actId="20577"/>
-          <ac:spMkLst>
-            <pc:docMk/>
-            <pc:sldMk cId="655007746" sldId="281"/>
-            <ac:spMk id="2" creationId="{75355994-6C54-41DA-9FEF-22C4894D5C02}"/>
-          </ac:spMkLst>
-        </pc:spChg>
-        <pc:spChg chg="mod">
-          <ac:chgData name="Wang, Charles" userId="b1269e5f-19cd-4bc8-97bb-dd1e093c722b" providerId="ADAL" clId="{66F978F5-050C-4757-92B1-DCF09D03401F}" dt="2020-07-28T19:33:47.298" v="1730" actId="20577"/>
-          <ac:spMkLst>
-            <pc:docMk/>
-            <pc:sldMk cId="655007746" sldId="281"/>
-            <ac:spMk id="3" creationId="{E6A666D6-AB47-4AC5-AF89-E91B76A86F1C}"/>
-          </ac:spMkLst>
-        </pc:spChg>
-      </pc:sldChg>
-      <pc:sldChg chg="modSp add mod">
-        <pc:chgData name="Wang, Charles" userId="b1269e5f-19cd-4bc8-97bb-dd1e093c722b" providerId="ADAL" clId="{66F978F5-050C-4757-92B1-DCF09D03401F}" dt="2020-07-28T20:03:51.662" v="1995" actId="20577"/>
-        <pc:sldMkLst>
-          <pc:docMk/>
-          <pc:sldMk cId="347600363" sldId="282"/>
-        </pc:sldMkLst>
-        <pc:spChg chg="mod">
-          <ac:chgData name="Wang, Charles" userId="b1269e5f-19cd-4bc8-97bb-dd1e093c722b" providerId="ADAL" clId="{66F978F5-050C-4757-92B1-DCF09D03401F}" dt="2020-07-28T20:03:51.662" v="1995" actId="20577"/>
-          <ac:spMkLst>
-            <pc:docMk/>
-            <pc:sldMk cId="347600363" sldId="282"/>
-            <ac:spMk id="3" creationId="{E6A666D6-AB47-4AC5-AF89-E91B76A86F1C}"/>
-          </ac:spMkLst>
-        </pc:spChg>
-      </pc:sldChg>
-      <pc:sldChg chg="modSp add mod">
-        <pc:chgData name="Wang, Charles" userId="b1269e5f-19cd-4bc8-97bb-dd1e093c722b" providerId="ADAL" clId="{66F978F5-050C-4757-92B1-DCF09D03401F}" dt="2020-07-28T19:37:13.727" v="1766" actId="20577"/>
-        <pc:sldMkLst>
-          <pc:docMk/>
-          <pc:sldMk cId="3330736222" sldId="283"/>
-        </pc:sldMkLst>
-        <pc:spChg chg="mod">
-          <ac:chgData name="Wang, Charles" userId="b1269e5f-19cd-4bc8-97bb-dd1e093c722b" providerId="ADAL" clId="{66F978F5-050C-4757-92B1-DCF09D03401F}" dt="2020-07-28T19:37:09.411" v="1765" actId="20577"/>
-          <ac:spMkLst>
-            <pc:docMk/>
-            <pc:sldMk cId="3330736222" sldId="283"/>
-            <ac:spMk id="2" creationId="{068E50B1-1BEF-4593-9559-A3295F2E0514}"/>
-          </ac:spMkLst>
-        </pc:spChg>
-        <pc:spChg chg="mod">
-          <ac:chgData name="Wang, Charles" userId="b1269e5f-19cd-4bc8-97bb-dd1e093c722b" providerId="ADAL" clId="{66F978F5-050C-4757-92B1-DCF09D03401F}" dt="2020-07-28T19:37:13.727" v="1766" actId="20577"/>
-          <ac:spMkLst>
-            <pc:docMk/>
-            <pc:sldMk cId="3330736222" sldId="283"/>
-            <ac:spMk id="3" creationId="{9B92FD1B-FE44-487F-A90E-99566DE74CFC}"/>
-          </ac:spMkLst>
-        </pc:spChg>
-      </pc:sldChg>
-      <pc:sldChg chg="modSp add mod">
-        <pc:chgData name="Wang, Charles" userId="b1269e5f-19cd-4bc8-97bb-dd1e093c722b" providerId="ADAL" clId="{66F978F5-050C-4757-92B1-DCF09D03401F}" dt="2020-07-28T20:07:09.047" v="2405" actId="20577"/>
-        <pc:sldMkLst>
-          <pc:docMk/>
-          <pc:sldMk cId="1851018958" sldId="284"/>
-        </pc:sldMkLst>
-        <pc:spChg chg="mod">
-          <ac:chgData name="Wang, Charles" userId="b1269e5f-19cd-4bc8-97bb-dd1e093c722b" providerId="ADAL" clId="{66F978F5-050C-4757-92B1-DCF09D03401F}" dt="2020-07-28T20:07:09.047" v="2405" actId="20577"/>
-          <ac:spMkLst>
-            <pc:docMk/>
-            <pc:sldMk cId="1851018958" sldId="284"/>
-            <ac:spMk id="3" creationId="{E6A666D6-AB47-4AC5-AF89-E91B76A86F1C}"/>
-          </ac:spMkLst>
-        </pc:spChg>
-      </pc:sldChg>
-      <pc:sldChg chg="modSp add mod">
-        <pc:chgData name="Wang, Charles" userId="b1269e5f-19cd-4bc8-97bb-dd1e093c722b" providerId="ADAL" clId="{66F978F5-050C-4757-92B1-DCF09D03401F}" dt="2020-07-28T20:08:01.940" v="2590" actId="20577"/>
-        <pc:sldMkLst>
-          <pc:docMk/>
-          <pc:sldMk cId="1946268761" sldId="285"/>
-        </pc:sldMkLst>
-        <pc:spChg chg="mod">
-          <ac:chgData name="Wang, Charles" userId="b1269e5f-19cd-4bc8-97bb-dd1e093c722b" providerId="ADAL" clId="{66F978F5-050C-4757-92B1-DCF09D03401F}" dt="2020-07-28T20:08:01.940" v="2590" actId="20577"/>
-          <ac:spMkLst>
-            <pc:docMk/>
-            <pc:sldMk cId="1946268761" sldId="285"/>
-            <ac:spMk id="3" creationId="{E6A666D6-AB47-4AC5-AF89-E91B76A86F1C}"/>
-          </ac:spMkLst>
-        </pc:spChg>
-      </pc:sldChg>
-      <pc:sldChg chg="add del">
-        <pc:chgData name="Wang, Charles" userId="b1269e5f-19cd-4bc8-97bb-dd1e093c722b" providerId="ADAL" clId="{66F978F5-050C-4757-92B1-DCF09D03401F}" dt="2020-07-28T19:49:52.050" v="1792" actId="47"/>
-        <pc:sldMkLst>
-          <pc:docMk/>
-          <pc:sldMk cId="3418088085" sldId="286"/>
-        </pc:sldMkLst>
-      </pc:sldChg>
-      <pc:sldChg chg="modSp add mod ord">
-        <pc:chgData name="Wang, Charles" userId="b1269e5f-19cd-4bc8-97bb-dd1e093c722b" providerId="ADAL" clId="{66F978F5-050C-4757-92B1-DCF09D03401F}" dt="2020-07-28T20:04:15.437" v="2003"/>
-        <pc:sldMkLst>
-          <pc:docMk/>
-          <pc:sldMk cId="4000663865" sldId="287"/>
-        </pc:sldMkLst>
-        <pc:spChg chg="mod">
-          <ac:chgData name="Wang, Charles" userId="b1269e5f-19cd-4bc8-97bb-dd1e093c722b" providerId="ADAL" clId="{66F978F5-050C-4757-92B1-DCF09D03401F}" dt="2020-07-28T20:04:08.271" v="1999" actId="6549"/>
-          <ac:spMkLst>
-            <pc:docMk/>
-            <pc:sldMk cId="4000663865" sldId="287"/>
-            <ac:spMk id="3" creationId="{E6A666D6-AB47-4AC5-AF89-E91B76A86F1C}"/>
-          </ac:spMkLst>
-        </pc:spChg>
-      </pc:sldChg>
-      <pc:sldChg chg="add del">
-        <pc:chgData name="Wang, Charles" userId="b1269e5f-19cd-4bc8-97bb-dd1e093c722b" providerId="ADAL" clId="{66F978F5-050C-4757-92B1-DCF09D03401F}" dt="2020-07-28T19:49:57.883" v="1794" actId="47"/>
-        <pc:sldMkLst>
-          <pc:docMk/>
-          <pc:sldMk cId="756629324" sldId="288"/>
-        </pc:sldMkLst>
-      </pc:sldChg>
-      <pc:sldChg chg="modSp add mod ord">
-        <pc:chgData name="Wang, Charles" userId="b1269e5f-19cd-4bc8-97bb-dd1e093c722b" providerId="ADAL" clId="{66F978F5-050C-4757-92B1-DCF09D03401F}" dt="2020-07-28T20:07:23.949" v="2409"/>
-        <pc:sldMkLst>
-          <pc:docMk/>
-          <pc:sldMk cId="2391865995" sldId="289"/>
-        </pc:sldMkLst>
-        <pc:spChg chg="mod">
-          <ac:chgData name="Wang, Charles" userId="b1269e5f-19cd-4bc8-97bb-dd1e093c722b" providerId="ADAL" clId="{66F978F5-050C-4757-92B1-DCF09D03401F}" dt="2020-07-28T20:07:20.262" v="2407"/>
-          <ac:spMkLst>
-            <pc:docMk/>
-            <pc:sldMk cId="2391865995" sldId="289"/>
-            <ac:spMk id="3" creationId="{E6A666D6-AB47-4AC5-AF89-E91B76A86F1C}"/>
-          </ac:spMkLst>
-        </pc:spChg>
-      </pc:sldChg>
-      <pc:sldChg chg="add del">
-        <pc:chgData name="Wang, Charles" userId="b1269e5f-19cd-4bc8-97bb-dd1e093c722b" providerId="ADAL" clId="{66F978F5-050C-4757-92B1-DCF09D03401F}" dt="2020-07-28T19:50:03.087" v="1796" actId="47"/>
-        <pc:sldMkLst>
-          <pc:docMk/>
-          <pc:sldMk cId="423266084" sldId="290"/>
-        </pc:sldMkLst>
-      </pc:sldChg>
-      <pc:sldChg chg="modSp add mod ord">
-        <pc:chgData name="Wang, Charles" userId="b1269e5f-19cd-4bc8-97bb-dd1e093c722b" providerId="ADAL" clId="{66F978F5-050C-4757-92B1-DCF09D03401F}" dt="2020-07-28T20:08:07.527" v="2593"/>
-        <pc:sldMkLst>
-          <pc:docMk/>
-          <pc:sldMk cId="231077449" sldId="291"/>
-        </pc:sldMkLst>
-        <pc:spChg chg="mod">
-          <ac:chgData name="Wang, Charles" userId="b1269e5f-19cd-4bc8-97bb-dd1e093c722b" providerId="ADAL" clId="{66F978F5-050C-4757-92B1-DCF09D03401F}" dt="2020-07-28T20:08:07.527" v="2593"/>
-          <ac:spMkLst>
-            <pc:docMk/>
-            <pc:sldMk cId="231077449" sldId="291"/>
-            <ac:spMk id="3" creationId="{E6A666D6-AB47-4AC5-AF89-E91B76A86F1C}"/>
-          </ac:spMkLst>
-        </pc:spChg>
-      </pc:sldChg>
-      <pc:sldChg chg="modSp add mod">
-        <pc:chgData name="Wang, Charles" userId="b1269e5f-19cd-4bc8-97bb-dd1e093c722b" providerId="ADAL" clId="{66F978F5-050C-4757-92B1-DCF09D03401F}" dt="2020-07-29T15:10:15.465" v="2711" actId="20577"/>
-        <pc:sldMkLst>
-          <pc:docMk/>
-          <pc:sldMk cId="1537254823" sldId="292"/>
-        </pc:sldMkLst>
-        <pc:spChg chg="mod">
-          <ac:chgData name="Wang, Charles" userId="b1269e5f-19cd-4bc8-97bb-dd1e093c722b" providerId="ADAL" clId="{66F978F5-050C-4757-92B1-DCF09D03401F}" dt="2020-07-29T15:10:15.465" v="2711" actId="20577"/>
-          <ac:spMkLst>
-            <pc:docMk/>
-            <pc:sldMk cId="1537254823" sldId="292"/>
-            <ac:spMk id="3" creationId="{E6A666D6-AB47-4AC5-AF89-E91B76A86F1C}"/>
-          </ac:spMkLst>
-        </pc:spChg>
-      </pc:sldChg>
-      <pc:sldChg chg="modSp add mod">
-        <pc:chgData name="Wang, Charles" userId="b1269e5f-19cd-4bc8-97bb-dd1e093c722b" providerId="ADAL" clId="{66F978F5-050C-4757-92B1-DCF09D03401F}" dt="2020-07-29T17:50:42.939" v="2775" actId="14"/>
-        <pc:sldMkLst>
-          <pc:docMk/>
-          <pc:sldMk cId="3511933421" sldId="293"/>
-        </pc:sldMkLst>
-        <pc:spChg chg="mod">
-          <ac:chgData name="Wang, Charles" userId="b1269e5f-19cd-4bc8-97bb-dd1e093c722b" providerId="ADAL" clId="{66F978F5-050C-4757-92B1-DCF09D03401F}" dt="2020-07-29T17:50:42.939" v="2775" actId="14"/>
-          <ac:spMkLst>
-            <pc:docMk/>
-            <pc:sldMk cId="3511933421" sldId="293"/>
-            <ac:spMk id="3" creationId="{E6A666D6-AB47-4AC5-AF89-E91B76A86F1C}"/>
-          </ac:spMkLst>
-        </pc:spChg>
-      </pc:sldChg>
-      <pc:sldChg chg="modSp add mod">
-        <pc:chgData name="Wang, Charles" userId="b1269e5f-19cd-4bc8-97bb-dd1e093c722b" providerId="ADAL" clId="{66F978F5-050C-4757-92B1-DCF09D03401F}" dt="2020-07-29T15:11:19.812" v="2770" actId="20577"/>
-        <pc:sldMkLst>
-          <pc:docMk/>
-          <pc:sldMk cId="468217530" sldId="294"/>
-        </pc:sldMkLst>
-        <pc:spChg chg="mod">
-          <ac:chgData name="Wang, Charles" userId="b1269e5f-19cd-4bc8-97bb-dd1e093c722b" providerId="ADAL" clId="{66F978F5-050C-4757-92B1-DCF09D03401F}" dt="2020-07-29T15:11:19.812" v="2770" actId="20577"/>
-          <ac:spMkLst>
-            <pc:docMk/>
-            <pc:sldMk cId="468217530" sldId="294"/>
-            <ac:spMk id="3" creationId="{E6A666D6-AB47-4AC5-AF89-E91B76A86F1C}"/>
-          </ac:spMkLst>
-        </pc:spChg>
-      </pc:sldChg>
-      <pc:sldChg chg="addSp delSp modSp add mod modClrScheme chgLayout">
-        <pc:chgData name="Wang, Charles" userId="b1269e5f-19cd-4bc8-97bb-dd1e093c722b" providerId="ADAL" clId="{66F978F5-050C-4757-92B1-DCF09D03401F}" dt="2020-07-28T20:06:56.671" v="2352" actId="20577"/>
-        <pc:sldMkLst>
-          <pc:docMk/>
-          <pc:sldMk cId="3901875276" sldId="295"/>
-        </pc:sldMkLst>
-        <pc:spChg chg="mod ord">
-          <ac:chgData name="Wang, Charles" userId="b1269e5f-19cd-4bc8-97bb-dd1e093c722b" providerId="ADAL" clId="{66F978F5-050C-4757-92B1-DCF09D03401F}" dt="2020-07-28T20:06:50.377" v="2307" actId="700"/>
-          <ac:spMkLst>
-            <pc:docMk/>
-            <pc:sldMk cId="3901875276" sldId="295"/>
-            <ac:spMk id="2" creationId="{75355994-6C54-41DA-9FEF-22C4894D5C02}"/>
-          </ac:spMkLst>
-        </pc:spChg>
-        <pc:spChg chg="mod ord">
-          <ac:chgData name="Wang, Charles" userId="b1269e5f-19cd-4bc8-97bb-dd1e093c722b" providerId="ADAL" clId="{66F978F5-050C-4757-92B1-DCF09D03401F}" dt="2020-07-28T20:06:56.671" v="2352" actId="20577"/>
-          <ac:spMkLst>
-            <pc:docMk/>
-            <pc:sldMk cId="3901875276" sldId="295"/>
-            <ac:spMk id="3" creationId="{E6A666D6-AB47-4AC5-AF89-E91B76A86F1C}"/>
-          </ac:spMkLst>
-        </pc:spChg>
-        <pc:spChg chg="del">
-          <ac:chgData name="Wang, Charles" userId="b1269e5f-19cd-4bc8-97bb-dd1e093c722b" providerId="ADAL" clId="{66F978F5-050C-4757-92B1-DCF09D03401F}" dt="2020-07-28T20:06:46.775" v="2306" actId="478"/>
-          <ac:spMkLst>
-            <pc:docMk/>
-            <pc:sldMk cId="3901875276" sldId="295"/>
-            <ac:spMk id="4" creationId="{8820B31A-811F-4660-A51D-BE6DCF7CD53F}"/>
-          </ac:spMkLst>
-        </pc:spChg>
-        <pc:spChg chg="add del mod">
-          <ac:chgData name="Wang, Charles" userId="b1269e5f-19cd-4bc8-97bb-dd1e093c722b" providerId="ADAL" clId="{66F978F5-050C-4757-92B1-DCF09D03401F}" dt="2020-07-28T20:06:50.377" v="2307" actId="700"/>
-          <ac:spMkLst>
-            <pc:docMk/>
-            <pc:sldMk cId="3901875276" sldId="295"/>
-            <ac:spMk id="6" creationId="{33B53BF9-6493-4A19-BF89-AB953304E3AE}"/>
-          </ac:spMkLst>
-        </pc:spChg>
-      </pc:sldChg>
-    </pc:docChg>
-  </pc:docChgLst>
-</pc:chgInfo>
-</file>
-
 <file path=ppt/notesMasters/notesMaster1.xml><?xml version="1.0" encoding="utf-8"?>
 <p:notesMaster xmlns:a="http://schemas.openxmlformats.org/drawingml/2006/main" xmlns:r="http://schemas.openxmlformats.org/officeDocument/2006/relationships" xmlns:p="http://schemas.openxmlformats.org/presentationml/2006/main">
   <p:cSld>
@@ -708,7 +227,7 @@
           <a:p>
             <a:fld id="{6BE60906-66D1-4B26-B813-18E8CE13C820}" type="datetimeFigureOut">
               <a:rPr lang="en-US" smtClean="0"/>
-              <a:t>7/28/2020</a:t>
+              <a:t>8/3/2020</a:t>
             </a:fld>
             <a:endParaRPr lang="en-US"/>
           </a:p>
@@ -1568,19 +1087,7 @@
           <a:p>
             <a:r>
               <a:rPr lang="en-US" dirty="0"/>
-              <a:t>For our very first day, we have the following assignments.</a:t>
-            </a:r>
-          </a:p>
-          <a:p>
-            <a:r>
-              <a:rPr lang="en-US" dirty="0"/>
-              <a:t>There is a worksheet for you to complete and some coding practice revolving around the use of whitespace.</a:t>
-            </a:r>
-          </a:p>
-          <a:p>
-            <a:r>
-              <a:rPr lang="en-US" dirty="0"/>
-              <a:t>Finally, please follow the link to my question form! Bookmark this page and have it on hand; if you ever have any questions, comments, feedback, or want clarification, fill out this form and I will get back to you as soon as possible!</a:t>
+              <a:t>Talk about Objectives</a:t>
             </a:r>
           </a:p>
         </p:txBody>
@@ -1713,13 +1220,8 @@
           <a:p>
             <a:r>
               <a:rPr lang="en-US" dirty="0"/>
-              <a:t>Note that I said we end commands with a semi-colon, not every line of code. So the class name and main method do not have semi-colons, however the command </a:t>
-            </a:r>
-            <a:r>
-              <a:rPr lang="en-US"/>
-              <a:t>to print does.</a:t>
-            </a:r>
-            <a:endParaRPr lang="en-US" dirty="0"/>
+              <a:t>Note that I said we end commands with a semi-colon, not every line of code. So the class name and main method do not have semi-colons, however the command to print does.</a:t>
+            </a:r>
           </a:p>
           <a:p>
             <a:endParaRPr lang="en-US" dirty="0"/>
@@ -2365,22 +1867,7 @@
           <a:bodyPr/>
           <a:lstStyle/>
           <a:p>
-            <a:r>
-              <a:rPr lang="en-US" dirty="0"/>
-              <a:t>For our very first day, we have the following assignments.</a:t>
-            </a:r>
-          </a:p>
-          <a:p>
-            <a:r>
-              <a:rPr lang="en-US" dirty="0"/>
-              <a:t>There is a worksheet for you to complete and some coding practice revolving around the use of whitespace.</a:t>
-            </a:r>
-          </a:p>
-          <a:p>
-            <a:r>
-              <a:rPr lang="en-US" dirty="0"/>
-              <a:t>Finally, please follow the link to my question form! Bookmark this page and have it on hand; if you ever have any questions, comments, feedback, or want clarification, fill out this form and I will get back to you as soon as possible!</a:t>
-            </a:r>
+            <a:endParaRPr lang="en-US" dirty="0"/>
           </a:p>
         </p:txBody>
       </p:sp>
@@ -3521,13 +3008,7 @@
           <a:p>
             <a:r>
               <a:rPr lang="en-US" dirty="0"/>
-              <a:t>For our very first day, we have the following assignments.</a:t>
-            </a:r>
-          </a:p>
-          <a:p>
-            <a:r>
-              <a:rPr lang="en-US" dirty="0"/>
-              <a:t>There is a worksheet for you to complete and some coding practice revolving around the use of whitespace.</a:t>
+              <a:t>For our very first day, we do not have any assignments for a grade. However, make sure you have all the appropriate accounts set up, and you can read CS Awesome 1.1 to review what we talked about. </a:t>
             </a:r>
           </a:p>
           <a:p>
@@ -3871,15 +3352,8 @@
             </a:pPr>
             <a:r>
               <a:rPr lang="en-US" dirty="0"/>
-              <a:t>Java class names follow the “Snake Case” convention – where every word is capitalized. Please note that this is different from python</a:t>
-            </a:r>
-          </a:p>
-          <a:p>
-            <a:pPr marL="171450" indent="-171450">
-              <a:buFontTx/>
-              <a:buChar char="-"/>
-            </a:pPr>
-            <a:endParaRPr lang="en-US" dirty="0"/>
+              <a:t>Java class names follow the convention where every word is capitalized. </a:t>
+            </a:r>
           </a:p>
           <a:p>
             <a:pPr marL="0" indent="0">
@@ -4165,7 +3639,7 @@
           <a:p>
             <a:fld id="{816DD38A-BD5D-446A-AEBD-FC3DDED4FB5C}" type="datetimeFigureOut">
               <a:rPr lang="en-US" smtClean="0"/>
-              <a:t>7/28/2020</a:t>
+              <a:t>8/3/2020</a:t>
             </a:fld>
             <a:endParaRPr lang="en-US"/>
           </a:p>
@@ -4373,7 +3847,7 @@
           <a:p>
             <a:fld id="{816DD38A-BD5D-446A-AEBD-FC3DDED4FB5C}" type="datetimeFigureOut">
               <a:rPr lang="en-US" smtClean="0"/>
-              <a:t>7/28/2020</a:t>
+              <a:t>8/3/2020</a:t>
             </a:fld>
             <a:endParaRPr lang="en-US"/>
           </a:p>
@@ -4629,7 +4103,7 @@
           <a:p>
             <a:fld id="{816DD38A-BD5D-446A-AEBD-FC3DDED4FB5C}" type="datetimeFigureOut">
               <a:rPr lang="en-US" smtClean="0"/>
-              <a:t>7/28/2020</a:t>
+              <a:t>8/3/2020</a:t>
             </a:fld>
             <a:endParaRPr lang="en-US"/>
           </a:p>
@@ -4803,7 +4277,7 @@
           <a:p>
             <a:fld id="{816DD38A-BD5D-446A-AEBD-FC3DDED4FB5C}" type="datetimeFigureOut">
               <a:rPr lang="en-US" smtClean="0"/>
-              <a:t>7/28/2020</a:t>
+              <a:t>8/3/2020</a:t>
             </a:fld>
             <a:endParaRPr lang="en-US"/>
           </a:p>
@@ -5146,7 +4620,7 @@
           <a:p>
             <a:fld id="{816DD38A-BD5D-446A-AEBD-FC3DDED4FB5C}" type="datetimeFigureOut">
               <a:rPr lang="en-US" smtClean="0"/>
-              <a:t>7/28/2020</a:t>
+              <a:t>8/3/2020</a:t>
             </a:fld>
             <a:endParaRPr lang="en-US"/>
           </a:p>
@@ -5421,7 +4895,7 @@
           <a:p>
             <a:fld id="{816DD38A-BD5D-446A-AEBD-FC3DDED4FB5C}" type="datetimeFigureOut">
               <a:rPr lang="en-US" smtClean="0"/>
-              <a:t>7/28/2020</a:t>
+              <a:t>8/3/2020</a:t>
             </a:fld>
             <a:endParaRPr lang="en-US"/>
           </a:p>
@@ -5800,7 +5274,7 @@
           <a:p>
             <a:fld id="{816DD38A-BD5D-446A-AEBD-FC3DDED4FB5C}" type="datetimeFigureOut">
               <a:rPr lang="en-US" smtClean="0"/>
-              <a:t>7/28/2020</a:t>
+              <a:t>8/3/2020</a:t>
             </a:fld>
             <a:endParaRPr lang="en-US"/>
           </a:p>
@@ -5918,7 +5392,7 @@
           <a:p>
             <a:fld id="{816DD38A-BD5D-446A-AEBD-FC3DDED4FB5C}" type="datetimeFigureOut">
               <a:rPr lang="en-US" smtClean="0"/>
-              <a:t>7/28/2020</a:t>
+              <a:t>8/3/2020</a:t>
             </a:fld>
             <a:endParaRPr lang="en-US"/>
           </a:p>
@@ -6089,7 +5563,7 @@
           <a:p>
             <a:fld id="{816DD38A-BD5D-446A-AEBD-FC3DDED4FB5C}" type="datetimeFigureOut">
               <a:rPr lang="en-US" smtClean="0"/>
-              <a:t>7/28/2020</a:t>
+              <a:t>8/3/2020</a:t>
             </a:fld>
             <a:endParaRPr lang="en-US"/>
           </a:p>
@@ -6443,7 +5917,7 @@
           <a:p>
             <a:fld id="{816DD38A-BD5D-446A-AEBD-FC3DDED4FB5C}" type="datetimeFigureOut">
               <a:rPr lang="en-US" smtClean="0"/>
-              <a:t>7/28/2020</a:t>
+              <a:t>8/3/2020</a:t>
             </a:fld>
             <a:endParaRPr lang="en-US"/>
           </a:p>
@@ -6825,7 +6299,7 @@
           <a:p>
             <a:fld id="{816DD38A-BD5D-446A-AEBD-FC3DDED4FB5C}" type="datetimeFigureOut">
               <a:rPr lang="en-US" smtClean="0"/>
-              <a:t>7/28/2020</a:t>
+              <a:t>8/3/2020</a:t>
             </a:fld>
             <a:endParaRPr lang="en-US"/>
           </a:p>
@@ -7112,7 +6586,7 @@
           <a:p>
             <a:fld id="{816DD38A-BD5D-446A-AEBD-FC3DDED4FB5C}" type="datetimeFigureOut">
               <a:rPr lang="en-US" smtClean="0"/>
-              <a:t>7/28/2020</a:t>
+              <a:t>8/3/2020</a:t>
             </a:fld>
             <a:endParaRPr lang="en-US"/>
           </a:p>
@@ -8002,7 +7476,7 @@
             <a:pPr lvl="1"/>
             <a:r>
               <a:rPr lang="en-US" dirty="0" err="1"/>
-              <a:t>SnakeCaseBasicallyEveryWordIsCapitalizedIfItIsMoreThanOneWord</a:t>
+              <a:t>EveryWordIsCapitlized</a:t>
             </a:r>
             <a:endParaRPr lang="en-US" dirty="0"/>
           </a:p>
@@ -8537,7 +8011,7 @@
             <a:pPr lvl="1"/>
             <a:r>
               <a:rPr lang="en-US" dirty="0"/>
-              <a:t>None</a:t>
+              <a:t>See 01_Scaffolding</a:t>
             </a:r>
           </a:p>
           <a:p>
@@ -9159,9 +8633,15 @@
           </a:p>
           <a:p>
             <a:r>
-              <a:rPr lang="en-US" dirty="0"/>
-              <a:t>Create it yourself!</a:t>
-            </a:r>
+              <a:rPr lang="en-US" dirty="0">
+                <a:hlinkClick r:id="rId3"/>
+              </a:rPr>
+              <a:t>https://github.com/thewangclass/apcsa-curriculum</a:t>
+            </a:r>
+            <a:endParaRPr lang="en-US" dirty="0"/>
+          </a:p>
+          <a:p>
+            <a:endParaRPr lang="en-US" dirty="0"/>
           </a:p>
         </p:txBody>
       </p:sp>
@@ -9460,16 +8940,15 @@
           <a:p>
             <a:pPr lvl="1"/>
             <a:r>
-              <a:rPr lang="en-US"/>
+              <a:rPr lang="en-US" dirty="0"/>
               <a:t>Hello World</a:t>
             </a:r>
           </a:p>
           <a:p>
             <a:r>
-              <a:rPr lang="en-US"/>
+              <a:rPr lang="en-US" dirty="0"/>
               <a:t>Worksheet</a:t>
             </a:r>
-            <a:endParaRPr lang="en-US" dirty="0"/>
           </a:p>
           <a:p>
             <a:pPr lvl="1"/>
@@ -9501,7 +8980,7 @@
             <a:pPr lvl="1"/>
             <a:r>
               <a:rPr lang="en-US" dirty="0"/>
-              <a:t>None</a:t>
+              <a:t>See 01_Scaffolding</a:t>
             </a:r>
           </a:p>
           <a:p>
@@ -10454,7 +9933,7 @@
             <a:pPr lvl="1"/>
             <a:r>
               <a:rPr lang="en-US" dirty="0"/>
-              <a:t>None</a:t>
+              <a:t>See 01_Scaffolding</a:t>
             </a:r>
           </a:p>
           <a:p>
@@ -11074,7 +10553,7 @@
             <a:pPr lvl="1"/>
             <a:r>
               <a:rPr lang="en-US" dirty="0"/>
-              <a:t>None</a:t>
+              <a:t>See 01_Scaffolding</a:t>
             </a:r>
           </a:p>
           <a:p>
@@ -11792,6 +11271,68 @@
 </file>
 
 <file path=customXml/item1.xml><?xml version="1.0" encoding="utf-8"?>
+<?mso-contentType ?>
+<FormTemplates xmlns="http://schemas.microsoft.com/sharepoint/v3/contenttype/forms">
+  <Display>DocumentLibraryForm</Display>
+  <Edit>DocumentLibraryForm</Edit>
+  <New>DocumentLibraryForm</New>
+</FormTemplates>
+</file>
+
+<file path=customXml/item2.xml><?xml version="1.0" encoding="utf-8"?>
+<p:properties xmlns:p="http://schemas.microsoft.com/office/2006/metadata/properties" xmlns:xsi="http://www.w3.org/2001/XMLSchema-instance" xmlns:pc="http://schemas.microsoft.com/office/infopath/2007/PartnerControls">
+  <documentManagement>
+    <Invited_Students xmlns="82256a1b-9f38-4c4c-91e5-29854cada989" xsi:nil="true"/>
+    <_ip_UnifiedCompliancePolicyUIAction xmlns="http://schemas.microsoft.com/sharepoint/v3" xsi:nil="true"/>
+    <CultureName xmlns="82256a1b-9f38-4c4c-91e5-29854cada989" xsi:nil="true"/>
+    <Students xmlns="82256a1b-9f38-4c4c-91e5-29854cada989">
+      <UserInfo>
+        <DisplayName/>
+        <AccountId xsi:nil="true"/>
+        <AccountType/>
+      </UserInfo>
+    </Students>
+    <Templates xmlns="82256a1b-9f38-4c4c-91e5-29854cada989" xsi:nil="true"/>
+    <Owner xmlns="82256a1b-9f38-4c4c-91e5-29854cada989">
+      <UserInfo>
+        <DisplayName/>
+        <AccountId xsi:nil="true"/>
+        <AccountType/>
+      </UserInfo>
+    </Owner>
+    <Teachers xmlns="82256a1b-9f38-4c4c-91e5-29854cada989">
+      <UserInfo>
+        <DisplayName/>
+        <AccountId xsi:nil="true"/>
+        <AccountType/>
+      </UserInfo>
+    </Teachers>
+    <Student_Groups xmlns="82256a1b-9f38-4c4c-91e5-29854cada989">
+      <UserInfo>
+        <DisplayName/>
+        <AccountId xsi:nil="true"/>
+        <AccountType/>
+      </UserInfo>
+    </Student_Groups>
+    <Distribution_Groups xmlns="82256a1b-9f38-4c4c-91e5-29854cada989" xsi:nil="true"/>
+    <Is_Collaboration_Space_Locked xmlns="82256a1b-9f38-4c4c-91e5-29854cada989" xsi:nil="true"/>
+    <Invited_Teachers xmlns="82256a1b-9f38-4c4c-91e5-29854cada989" xsi:nil="true"/>
+    <LMS_Mappings xmlns="82256a1b-9f38-4c4c-91e5-29854cada989" xsi:nil="true"/>
+    <NotebookType xmlns="82256a1b-9f38-4c4c-91e5-29854cada989" xsi:nil="true"/>
+    <_ip_UnifiedCompliancePolicyProperties xmlns="http://schemas.microsoft.com/sharepoint/v3" xsi:nil="true"/>
+    <Has_Teacher_Only_SectionGroup xmlns="82256a1b-9f38-4c4c-91e5-29854cada989" xsi:nil="true"/>
+    <Math_Settings xmlns="82256a1b-9f38-4c4c-91e5-29854cada989" xsi:nil="true"/>
+    <DefaultSectionNames xmlns="82256a1b-9f38-4c4c-91e5-29854cada989" xsi:nil="true"/>
+    <AppVersion xmlns="82256a1b-9f38-4c4c-91e5-29854cada989" xsi:nil="true"/>
+    <FolderType xmlns="82256a1b-9f38-4c4c-91e5-29854cada989" xsi:nil="true"/>
+    <TeamsChannelId xmlns="82256a1b-9f38-4c4c-91e5-29854cada989" xsi:nil="true"/>
+    <IsNotebookLocked xmlns="82256a1b-9f38-4c4c-91e5-29854cada989" xsi:nil="true"/>
+    <Self_Registration_Enabled xmlns="82256a1b-9f38-4c4c-91e5-29854cada989" xsi:nil="true"/>
+  </documentManagement>
+</p:properties>
+</file>
+
+<file path=customXml/item3.xml><?xml version="1.0" encoding="utf-8"?>
 <ct:contentTypeSchema xmlns:ct="http://schemas.microsoft.com/office/2006/metadata/contentType" xmlns:ma="http://schemas.microsoft.com/office/2006/metadata/properties/metaAttributes" ct:_="" ma:_="" ma:contentTypeName="Document" ma:contentTypeID="0x010100AC977DB636FAC046B39EFB0EDCA79FB9" ma:contentTypeVersion="35" ma:contentTypeDescription="Create a new document." ma:contentTypeScope="" ma:versionID="0f64df24c85279f01587ad2aa5aed291">
   <xsd:schema xmlns:xsd="http://www.w3.org/2001/XMLSchema" xmlns:xs="http://www.w3.org/2001/XMLSchema" xmlns:p="http://schemas.microsoft.com/office/2006/metadata/properties" xmlns:ns1="http://schemas.microsoft.com/sharepoint/v3" xmlns:ns3="9e962e79-3fd0-4a6e-bcbc-b3738a4df2d9" xmlns:ns4="82256a1b-9f38-4c4c-91e5-29854cada989" targetNamespace="http://schemas.microsoft.com/office/2006/metadata/properties" ma:root="true" ma:fieldsID="86f674dd3b581b7c6038a385992766ca" ns1:_="" ns3:_="" ns4:_="">
     <xsd:import namespace="http://schemas.microsoft.com/sharepoint/v3"/>
@@ -12219,69 +11760,26 @@
 </ct:contentTypeSchema>
 </file>
 
-<file path=customXml/item2.xml><?xml version="1.0" encoding="utf-8"?>
-<p:properties xmlns:p="http://schemas.microsoft.com/office/2006/metadata/properties" xmlns:xsi="http://www.w3.org/2001/XMLSchema-instance" xmlns:pc="http://schemas.microsoft.com/office/infopath/2007/PartnerControls">
-  <documentManagement>
-    <Invited_Students xmlns="82256a1b-9f38-4c4c-91e5-29854cada989" xsi:nil="true"/>
-    <_ip_UnifiedCompliancePolicyUIAction xmlns="http://schemas.microsoft.com/sharepoint/v3" xsi:nil="true"/>
-    <CultureName xmlns="82256a1b-9f38-4c4c-91e5-29854cada989" xsi:nil="true"/>
-    <Students xmlns="82256a1b-9f38-4c4c-91e5-29854cada989">
-      <UserInfo>
-        <DisplayName/>
-        <AccountId xsi:nil="true"/>
-        <AccountType/>
-      </UserInfo>
-    </Students>
-    <Templates xmlns="82256a1b-9f38-4c4c-91e5-29854cada989" xsi:nil="true"/>
-    <Owner xmlns="82256a1b-9f38-4c4c-91e5-29854cada989">
-      <UserInfo>
-        <DisplayName/>
-        <AccountId xsi:nil="true"/>
-        <AccountType/>
-      </UserInfo>
-    </Owner>
-    <Teachers xmlns="82256a1b-9f38-4c4c-91e5-29854cada989">
-      <UserInfo>
-        <DisplayName/>
-        <AccountId xsi:nil="true"/>
-        <AccountType/>
-      </UserInfo>
-    </Teachers>
-    <Student_Groups xmlns="82256a1b-9f38-4c4c-91e5-29854cada989">
-      <UserInfo>
-        <DisplayName/>
-        <AccountId xsi:nil="true"/>
-        <AccountType/>
-      </UserInfo>
-    </Student_Groups>
-    <Distribution_Groups xmlns="82256a1b-9f38-4c4c-91e5-29854cada989" xsi:nil="true"/>
-    <Is_Collaboration_Space_Locked xmlns="82256a1b-9f38-4c4c-91e5-29854cada989" xsi:nil="true"/>
-    <Invited_Teachers xmlns="82256a1b-9f38-4c4c-91e5-29854cada989" xsi:nil="true"/>
-    <LMS_Mappings xmlns="82256a1b-9f38-4c4c-91e5-29854cada989" xsi:nil="true"/>
-    <NotebookType xmlns="82256a1b-9f38-4c4c-91e5-29854cada989" xsi:nil="true"/>
-    <_ip_UnifiedCompliancePolicyProperties xmlns="http://schemas.microsoft.com/sharepoint/v3" xsi:nil="true"/>
-    <Has_Teacher_Only_SectionGroup xmlns="82256a1b-9f38-4c4c-91e5-29854cada989" xsi:nil="true"/>
-    <Math_Settings xmlns="82256a1b-9f38-4c4c-91e5-29854cada989" xsi:nil="true"/>
-    <DefaultSectionNames xmlns="82256a1b-9f38-4c4c-91e5-29854cada989" xsi:nil="true"/>
-    <AppVersion xmlns="82256a1b-9f38-4c4c-91e5-29854cada989" xsi:nil="true"/>
-    <FolderType xmlns="82256a1b-9f38-4c4c-91e5-29854cada989" xsi:nil="true"/>
-    <TeamsChannelId xmlns="82256a1b-9f38-4c4c-91e5-29854cada989" xsi:nil="true"/>
-    <IsNotebookLocked xmlns="82256a1b-9f38-4c4c-91e5-29854cada989" xsi:nil="true"/>
-    <Self_Registration_Enabled xmlns="82256a1b-9f38-4c4c-91e5-29854cada989" xsi:nil="true"/>
-  </documentManagement>
-</p:properties>
+<file path=customXml/itemProps1.xml><?xml version="1.0" encoding="utf-8"?>
+<ds:datastoreItem xmlns:ds="http://schemas.openxmlformats.org/officeDocument/2006/customXml" ds:itemID="{08512FF1-D09C-4F6F-9BB2-E7BD1119A95E}">
+  <ds:schemaRefs>
+    <ds:schemaRef ds:uri="http://schemas.microsoft.com/sharepoint/v3/contenttype/forms"/>
+  </ds:schemaRefs>
+</ds:datastoreItem>
 </file>
 
-<file path=customXml/item3.xml><?xml version="1.0" encoding="utf-8"?>
-<?mso-contentType ?>
-<FormTemplates xmlns="http://schemas.microsoft.com/sharepoint/v3/contenttype/forms">
-  <Display>DocumentLibraryForm</Display>
-  <Edit>DocumentLibraryForm</Edit>
-  <New>DocumentLibraryForm</New>
-</FormTemplates>
+<file path=customXml/itemProps2.xml><?xml version="1.0" encoding="utf-8"?>
+<ds:datastoreItem xmlns:ds="http://schemas.openxmlformats.org/officeDocument/2006/customXml" ds:itemID="{093ED77E-2BD7-4868-8CBC-5258691730CF}">
+  <ds:schemaRefs>
+    <ds:schemaRef ds:uri="http://schemas.microsoft.com/office/2006/metadata/properties"/>
+    <ds:schemaRef ds:uri="http://schemas.microsoft.com/office/infopath/2007/PartnerControls"/>
+    <ds:schemaRef ds:uri="82256a1b-9f38-4c4c-91e5-29854cada989"/>
+    <ds:schemaRef ds:uri="http://schemas.microsoft.com/sharepoint/v3"/>
+  </ds:schemaRefs>
+</ds:datastoreItem>
 </file>
 
-<file path=customXml/itemProps1.xml><?xml version="1.0" encoding="utf-8"?>
+<file path=customXml/itemProps3.xml><?xml version="1.0" encoding="utf-8"?>
 <ds:datastoreItem xmlns:ds="http://schemas.openxmlformats.org/officeDocument/2006/customXml" ds:itemID="{9984A1E0-4B6D-4434-BF90-93C1F7AFE765}">
   <ds:schemaRefs>
     <ds:schemaRef ds:uri="http://schemas.microsoft.com/office/2006/metadata/contentType"/>
@@ -12299,23 +11797,4 @@
     <ds:schemaRef ds:uri="http://schemas.microsoft.com/internal/obd"/>
   </ds:schemaRefs>
 </ds:datastoreItem>
-</file>
-
-<file path=customXml/itemProps2.xml><?xml version="1.0" encoding="utf-8"?>
-<ds:datastoreItem xmlns:ds="http://schemas.openxmlformats.org/officeDocument/2006/customXml" ds:itemID="{093ED77E-2BD7-4868-8CBC-5258691730CF}">
-  <ds:schemaRefs>
-    <ds:schemaRef ds:uri="http://schemas.microsoft.com/office/2006/metadata/properties"/>
-    <ds:schemaRef ds:uri="http://schemas.microsoft.com/office/infopath/2007/PartnerControls"/>
-    <ds:schemaRef ds:uri="82256a1b-9f38-4c4c-91e5-29854cada989"/>
-    <ds:schemaRef ds:uri="http://schemas.microsoft.com/sharepoint/v3"/>
-  </ds:schemaRefs>
-</ds:datastoreItem>
-</file>
-
-<file path=customXml/itemProps3.xml><?xml version="1.0" encoding="utf-8"?>
-<ds:datastoreItem xmlns:ds="http://schemas.openxmlformats.org/officeDocument/2006/customXml" ds:itemID="{08512FF1-D09C-4F6F-9BB2-E7BD1119A95E}">
-  <ds:schemaRefs>
-    <ds:schemaRef ds:uri="http://schemas.microsoft.com/sharepoint/v3/contenttype/forms"/>
-  </ds:schemaRefs>
-</ds:datastoreItem>
 </file>
</xml_diff>